<commit_message>
Added Lecture 6 and examples.
</commit_message>
<xml_diff>
--- a/05-Arrays.pptx
+++ b/05-Arrays.pptx
@@ -5501,14 +5501,14 @@
               <a:t>int</a:t>
             </a:r>
             <a:r>
-              <a:rPr lang="en-US" dirty="0">
-                <a:solidFill>
-                  <a:schemeClr val="bg1">
-                    <a:lumMod val="95000"/>
-                  </a:schemeClr>
-                </a:solidFill>
-              </a:rPr>
-              <a:t>[][] </a:t>
+              <a:rPr lang="en-US" smtClean="0">
+                <a:solidFill>
+                  <a:schemeClr val="bg1">
+                    <a:lumMod val="95000"/>
+                  </a:schemeClr>
+                </a:solidFill>
+              </a:rPr>
+              <a:t>[][][] </a:t>
             </a:r>
             <a:r>
               <a:rPr lang="en-US" dirty="0" err="1" smtClean="0">

</xml_diff>